<commit_message>
02092023 - updated pp for meeting
</commit_message>
<xml_diff>
--- a/pp/digit-classification&intro-to-fully-connected-neural-network.pptx
+++ b/pp/digit-classification&intro-to-fully-connected-neural-network.pptx
@@ -5,7 +5,7 @@
     <p:sldMasterId id="2147483648" r:id="rId1"/>
   </p:sldMasterIdLst>
   <p:notesMasterIdLst>
-    <p:notesMasterId r:id="rId26"/>
+    <p:notesMasterId r:id="rId27"/>
   </p:notesMasterIdLst>
   <p:sldIdLst>
     <p:sldId id="256" r:id="rId2"/>
@@ -32,6 +32,7 @@
     <p:sldId id="279" r:id="rId23"/>
     <p:sldId id="270" r:id="rId24"/>
     <p:sldId id="273" r:id="rId25"/>
+    <p:sldId id="280" r:id="rId26"/>
   </p:sldIdLst>
   <p:sldSz cx="12192000" cy="6858000"/>
   <p:notesSz cx="6858000" cy="9144000"/>
@@ -2294,7 +2295,7 @@
           <a:p>
             <a:fld id="{593C2ADB-CC51-4918-9B2E-86C6317A06F3}" type="datetimeFigureOut">
               <a:rPr lang="en-US" smtClean="0"/>
-              <a:t>1/26/2023</a:t>
+              <a:t>2/9/2023</a:t>
             </a:fld>
             <a:endParaRPr lang="en-US"/>
           </a:p>
@@ -2679,6 +2680,133 @@
 </p:notes>
 </file>
 
+<file path=ppt/notesSlides/notesSlide10.xml><?xml version="1.0" encoding="utf-8"?>
+<p:notes xmlns:a="http://schemas.openxmlformats.org/drawingml/2006/main" xmlns:r="http://schemas.openxmlformats.org/officeDocument/2006/relationships" xmlns:p="http://schemas.openxmlformats.org/presentationml/2006/main">
+  <p:cSld>
+    <p:spTree>
+      <p:nvGrpSpPr>
+        <p:cNvPr id="1" name=""/>
+        <p:cNvGrpSpPr/>
+        <p:nvPr/>
+      </p:nvGrpSpPr>
+      <p:grpSpPr>
+        <a:xfrm>
+          <a:off x="0" y="0"/>
+          <a:ext cx="0" cy="0"/>
+          <a:chOff x="0" y="0"/>
+          <a:chExt cx="0" cy="0"/>
+        </a:xfrm>
+      </p:grpSpPr>
+      <p:sp>
+        <p:nvSpPr>
+          <p:cNvPr id="2" name="Slide Image Placeholder 1"/>
+          <p:cNvSpPr>
+            <a:spLocks noGrp="1" noRot="1" noChangeAspect="1"/>
+          </p:cNvSpPr>
+          <p:nvPr>
+            <p:ph type="sldImg"/>
+          </p:nvPr>
+        </p:nvSpPr>
+        <p:spPr/>
+      </p:sp>
+      <p:sp>
+        <p:nvSpPr>
+          <p:cNvPr id="3" name="Notes Placeholder 2"/>
+          <p:cNvSpPr>
+            <a:spLocks noGrp="1"/>
+          </p:cNvSpPr>
+          <p:nvPr>
+            <p:ph type="body" idx="1"/>
+          </p:nvPr>
+        </p:nvSpPr>
+        <p:spPr/>
+        <p:txBody>
+          <a:bodyPr/>
+          <a:lstStyle/>
+          <a:p>
+            <a:r>
+              <a:rPr lang="pl-PL" dirty="0"/>
+              <a:t> [2,1]</a:t>
+            </a:r>
+          </a:p>
+          <a:p>
+            <a:r>
+              <a:rPr lang="pl-PL" dirty="0"/>
+              <a:t>[1,1,1] -&gt; w = [1,0 -&gt; w=[1, 2] -&gt; [3,4]</a:t>
+            </a:r>
+          </a:p>
+          <a:p>
+            <a:r>
+              <a:rPr lang="pl-PL" dirty="0"/>
+              <a:t>                        1,0             1,0</a:t>
+            </a:r>
+          </a:p>
+          <a:p>
+            <a:r>
+              <a:rPr lang="pl-PL" dirty="0"/>
+              <a:t>                        1,1]</a:t>
+            </a:r>
+          </a:p>
+          <a:p>
+            <a:endParaRPr lang="pl-PL" dirty="0"/>
+          </a:p>
+          <a:p>
+            <a:r>
+              <a:rPr lang="pl-PL" dirty="0"/>
+              <a:t>                    [1,2</a:t>
+            </a:r>
+          </a:p>
+          <a:p>
+            <a:r>
+              <a:rPr lang="pl-PL" dirty="0"/>
+              <a:t>                     1,2,</a:t>
+            </a:r>
+          </a:p>
+          <a:p>
+            <a:r>
+              <a:rPr lang="pl-PL" dirty="0"/>
+              <a:t>                     1,0]</a:t>
+            </a:r>
+            <a:endParaRPr lang="en-US" dirty="0"/>
+          </a:p>
+        </p:txBody>
+      </p:sp>
+      <p:sp>
+        <p:nvSpPr>
+          <p:cNvPr id="4" name="Slide Number Placeholder 3"/>
+          <p:cNvSpPr>
+            <a:spLocks noGrp="1"/>
+          </p:cNvSpPr>
+          <p:nvPr>
+            <p:ph type="sldNum" sz="quarter" idx="5"/>
+          </p:nvPr>
+        </p:nvSpPr>
+        <p:spPr/>
+        <p:txBody>
+          <a:bodyPr/>
+          <a:lstStyle/>
+          <a:p>
+            <a:fld id="{F6984CE2-0B23-4C0F-84E0-5A1D083542B4}" type="slidenum">
+              <a:rPr lang="en-US" smtClean="0"/>
+              <a:t>22</a:t>
+            </a:fld>
+            <a:endParaRPr lang="en-US"/>
+          </a:p>
+        </p:txBody>
+      </p:sp>
+    </p:spTree>
+    <p:extLst>
+      <p:ext uri="{BB962C8B-B14F-4D97-AF65-F5344CB8AC3E}">
+        <p14:creationId xmlns:p14="http://schemas.microsoft.com/office/powerpoint/2010/main" val="3422217395"/>
+      </p:ext>
+    </p:extLst>
+  </p:cSld>
+  <p:clrMapOvr>
+    <a:masterClrMapping/>
+  </p:clrMapOvr>
+</p:notes>
+</file>
+
 <file path=ppt/notesSlides/notesSlide2.xml><?xml version="1.0" encoding="utf-8"?>
 <p:notes xmlns:a="http://schemas.openxmlformats.org/drawingml/2006/main" xmlns:r="http://schemas.openxmlformats.org/officeDocument/2006/relationships" xmlns:p="http://schemas.openxmlformats.org/presentationml/2006/main">
   <p:cSld>
@@ -3543,7 +3671,7 @@
           <a:p>
             <a:fld id="{008B01A9-5802-49A2-9ECF-313EBA059F82}" type="datetimeFigureOut">
               <a:rPr lang="en-US" smtClean="0"/>
-              <a:t>1/26/2023</a:t>
+              <a:t>2/9/2023</a:t>
             </a:fld>
             <a:endParaRPr lang="en-US"/>
           </a:p>
@@ -3741,7 +3869,7 @@
           <a:p>
             <a:fld id="{008B01A9-5802-49A2-9ECF-313EBA059F82}" type="datetimeFigureOut">
               <a:rPr lang="en-US" smtClean="0"/>
-              <a:t>1/26/2023</a:t>
+              <a:t>2/9/2023</a:t>
             </a:fld>
             <a:endParaRPr lang="en-US"/>
           </a:p>
@@ -3949,7 +4077,7 @@
           <a:p>
             <a:fld id="{008B01A9-5802-49A2-9ECF-313EBA059F82}" type="datetimeFigureOut">
               <a:rPr lang="en-US" smtClean="0"/>
-              <a:t>1/26/2023</a:t>
+              <a:t>2/9/2023</a:t>
             </a:fld>
             <a:endParaRPr lang="en-US"/>
           </a:p>
@@ -4147,7 +4275,7 @@
           <a:p>
             <a:fld id="{008B01A9-5802-49A2-9ECF-313EBA059F82}" type="datetimeFigureOut">
               <a:rPr lang="en-US" smtClean="0"/>
-              <a:t>1/26/2023</a:t>
+              <a:t>2/9/2023</a:t>
             </a:fld>
             <a:endParaRPr lang="en-US"/>
           </a:p>
@@ -4422,7 +4550,7 @@
           <a:p>
             <a:fld id="{008B01A9-5802-49A2-9ECF-313EBA059F82}" type="datetimeFigureOut">
               <a:rPr lang="en-US" smtClean="0"/>
-              <a:t>1/26/2023</a:t>
+              <a:t>2/9/2023</a:t>
             </a:fld>
             <a:endParaRPr lang="en-US"/>
           </a:p>
@@ -4687,7 +4815,7 @@
           <a:p>
             <a:fld id="{008B01A9-5802-49A2-9ECF-313EBA059F82}" type="datetimeFigureOut">
               <a:rPr lang="en-US" smtClean="0"/>
-              <a:t>1/26/2023</a:t>
+              <a:t>2/9/2023</a:t>
             </a:fld>
             <a:endParaRPr lang="en-US"/>
           </a:p>
@@ -5099,7 +5227,7 @@
           <a:p>
             <a:fld id="{008B01A9-5802-49A2-9ECF-313EBA059F82}" type="datetimeFigureOut">
               <a:rPr lang="en-US" smtClean="0"/>
-              <a:t>1/26/2023</a:t>
+              <a:t>2/9/2023</a:t>
             </a:fld>
             <a:endParaRPr lang="en-US"/>
           </a:p>
@@ -5240,7 +5368,7 @@
           <a:p>
             <a:fld id="{008B01A9-5802-49A2-9ECF-313EBA059F82}" type="datetimeFigureOut">
               <a:rPr lang="en-US" smtClean="0"/>
-              <a:t>1/26/2023</a:t>
+              <a:t>2/9/2023</a:t>
             </a:fld>
             <a:endParaRPr lang="en-US"/>
           </a:p>
@@ -5353,7 +5481,7 @@
           <a:p>
             <a:fld id="{008B01A9-5802-49A2-9ECF-313EBA059F82}" type="datetimeFigureOut">
               <a:rPr lang="en-US" smtClean="0"/>
-              <a:t>1/26/2023</a:t>
+              <a:t>2/9/2023</a:t>
             </a:fld>
             <a:endParaRPr lang="en-US"/>
           </a:p>
@@ -5664,7 +5792,7 @@
           <a:p>
             <a:fld id="{008B01A9-5802-49A2-9ECF-313EBA059F82}" type="datetimeFigureOut">
               <a:rPr lang="en-US" smtClean="0"/>
-              <a:t>1/26/2023</a:t>
+              <a:t>2/9/2023</a:t>
             </a:fld>
             <a:endParaRPr lang="en-US"/>
           </a:p>
@@ -5952,7 +6080,7 @@
           <a:p>
             <a:fld id="{008B01A9-5802-49A2-9ECF-313EBA059F82}" type="datetimeFigureOut">
               <a:rPr lang="en-US" smtClean="0"/>
-              <a:t>1/26/2023</a:t>
+              <a:t>2/9/2023</a:t>
             </a:fld>
             <a:endParaRPr lang="en-US"/>
           </a:p>
@@ -6193,7 +6321,7 @@
           <a:p>
             <a:fld id="{008B01A9-5802-49A2-9ECF-313EBA059F82}" type="datetimeFigureOut">
               <a:rPr lang="en-US" smtClean="0"/>
-              <a:t>1/26/2023</a:t>
+              <a:t>2/9/2023</a:t>
             </a:fld>
             <a:endParaRPr lang="en-US"/>
           </a:p>
@@ -16171,12 +16299,12 @@
         <p:spPr>
           <a:xfrm>
             <a:off x="838200" y="1825625"/>
-            <a:ext cx="10226040" cy="1202055"/>
+            <a:ext cx="10226040" cy="4335689"/>
           </a:xfrm>
         </p:spPr>
         <p:txBody>
           <a:bodyPr>
-            <a:normAutofit fontScale="92500" lnSpcReduction="20000"/>
+            <a:normAutofit/>
           </a:bodyPr>
           <a:lstStyle/>
           <a:p>
@@ -16194,11 +16322,32 @@
           <a:p>
             <a:r>
               <a:rPr lang="en-US" dirty="0"/>
-              <a:t>Otherwise, the model only have </a:t>
-            </a:r>
-            <a:r>
-              <a:rPr lang="en-US"/>
-              <a:t>one layer.</a:t>
+              <a:t>Otherwise, the model only have one layer.</a:t>
+            </a:r>
+          </a:p>
+          <a:p>
+            <a:endParaRPr lang="en-US" dirty="0"/>
+          </a:p>
+          <a:p>
+            <a:endParaRPr lang="en-US" dirty="0"/>
+          </a:p>
+          <a:p>
+            <a:pPr marL="0" indent="0">
+              <a:buNone/>
+            </a:pPr>
+            <a:r>
+              <a:rPr lang="en-US" dirty="0"/>
+              <a:t>=&gt; </a:t>
+            </a:r>
+            <a:r>
+              <a:rPr lang="en-US" b="1" i="0" dirty="0">
+                <a:solidFill>
+                  <a:srgbClr val="202124"/>
+                </a:solidFill>
+                <a:effectLst/>
+                <a:latin typeface="arial" panose="020B0604020202020204" pitchFamily="34" charset="0"/>
+              </a:rPr>
+              <a:t>allow the model to fit more complex functions</a:t>
             </a:r>
             <a:endParaRPr lang="en-US" dirty="0"/>
           </a:p>
@@ -16789,6 +16938,98 @@
     <p:extLst>
       <p:ext uri="{BB962C8B-B14F-4D97-AF65-F5344CB8AC3E}">
         <p14:creationId xmlns:p14="http://schemas.microsoft.com/office/powerpoint/2010/main" val="3268291226"/>
+      </p:ext>
+    </p:extLst>
+  </p:cSld>
+  <p:clrMapOvr>
+    <a:masterClrMapping/>
+  </p:clrMapOvr>
+</p:sld>
+</file>
+
+<file path=ppt/slides/slide25.xml><?xml version="1.0" encoding="utf-8"?>
+<p:sld xmlns:a="http://schemas.openxmlformats.org/drawingml/2006/main" xmlns:r="http://schemas.openxmlformats.org/officeDocument/2006/relationships" xmlns:p="http://schemas.openxmlformats.org/presentationml/2006/main">
+  <p:cSld>
+    <p:spTree>
+      <p:nvGrpSpPr>
+        <p:cNvPr id="1" name=""/>
+        <p:cNvGrpSpPr/>
+        <p:nvPr/>
+      </p:nvGrpSpPr>
+      <p:grpSpPr>
+        <a:xfrm>
+          <a:off x="0" y="0"/>
+          <a:ext cx="0" cy="0"/>
+          <a:chOff x="0" y="0"/>
+          <a:chExt cx="0" cy="0"/>
+        </a:xfrm>
+      </p:grpSpPr>
+      <p:sp>
+        <p:nvSpPr>
+          <p:cNvPr id="2" name="Title 1">
+            <a:extLst>
+              <a:ext uri="{FF2B5EF4-FFF2-40B4-BE49-F238E27FC236}">
+                <a16:creationId xmlns:a16="http://schemas.microsoft.com/office/drawing/2014/main" id="{82F4B508-6C7A-B149-754C-D2852160D727}"/>
+              </a:ext>
+            </a:extLst>
+          </p:cNvPr>
+          <p:cNvSpPr>
+            <a:spLocks noGrp="1"/>
+          </p:cNvSpPr>
+          <p:nvPr>
+            <p:ph type="title"/>
+          </p:nvPr>
+        </p:nvSpPr>
+        <p:spPr/>
+        <p:txBody>
+          <a:bodyPr/>
+          <a:lstStyle/>
+          <a:p>
+            <a:endParaRPr lang="en-US"/>
+          </a:p>
+        </p:txBody>
+      </p:sp>
+      <p:sp>
+        <p:nvSpPr>
+          <p:cNvPr id="3" name="Content Placeholder 2">
+            <a:extLst>
+              <a:ext uri="{FF2B5EF4-FFF2-40B4-BE49-F238E27FC236}">
+                <a16:creationId xmlns:a16="http://schemas.microsoft.com/office/drawing/2014/main" id="{6222BA8A-0A38-026D-CFC7-D48F45468C46}"/>
+              </a:ext>
+            </a:extLst>
+          </p:cNvPr>
+          <p:cNvSpPr>
+            <a:spLocks noGrp="1"/>
+          </p:cNvSpPr>
+          <p:nvPr>
+            <p:ph idx="1"/>
+          </p:nvPr>
+        </p:nvSpPr>
+        <p:spPr/>
+        <p:txBody>
+          <a:bodyPr/>
+          <a:lstStyle/>
+          <a:p>
+            <a:r>
+              <a:rPr lang="en-US" dirty="0">
+                <a:hlinkClick r:id="rId2"/>
+              </a:rPr>
+              <a:t>Who Invented A.I.? </a:t>
+            </a:r>
+            <a:r>
+              <a:rPr lang="en-US">
+                <a:hlinkClick r:id="rId2"/>
+              </a:rPr>
+              <a:t>- The Pioneers of Our Future - YouTube</a:t>
+            </a:r>
+            <a:endParaRPr lang="en-US" dirty="0"/>
+          </a:p>
+        </p:txBody>
+      </p:sp>
+    </p:spTree>
+    <p:extLst>
+      <p:ext uri="{BB962C8B-B14F-4D97-AF65-F5344CB8AC3E}">
+        <p14:creationId xmlns:p14="http://schemas.microsoft.com/office/powerpoint/2010/main" val="3502352712"/>
       </p:ext>
     </p:extLst>
   </p:cSld>

</xml_diff>